<commit_message>
2025-09-27: Changes to 2025-07-20 EDA practice
</commit_message>
<xml_diff>
--- a/2025-09-13/Identifying Patterns of Employee Performance.pptx
+++ b/2025-09-13/Identifying Patterns of Employee Performance.pptx
@@ -11988,7 +11988,7 @@
           <a:p>
             <a:fld id="{CE6CB16A-CA2E-4C6A-9FE2-E647B82823FE}" type="datetimeFigureOut">
               <a:rPr lang="en-CA" smtClean="0"/>
-              <a:t>2025-09-21</a:t>
+              <a:t>2025-09-22</a:t>
             </a:fld>
             <a:endParaRPr lang="en-CA"/>
           </a:p>
@@ -14678,7 +14678,7 @@
           <a:p>
             <a:fld id="{A37A7E16-B735-4BCF-A3C0-B4D8575DFF96}" type="datetimeFigureOut">
               <a:rPr lang="en-CA" smtClean="0"/>
-              <a:t>2025-09-21</a:t>
+              <a:t>2025-09-22</a:t>
             </a:fld>
             <a:endParaRPr lang="en-CA"/>
           </a:p>
@@ -14878,7 +14878,7 @@
           <a:p>
             <a:fld id="{A37A7E16-B735-4BCF-A3C0-B4D8575DFF96}" type="datetimeFigureOut">
               <a:rPr lang="en-CA" smtClean="0"/>
-              <a:t>2025-09-21</a:t>
+              <a:t>2025-09-22</a:t>
             </a:fld>
             <a:endParaRPr lang="en-CA"/>
           </a:p>
@@ -15088,7 +15088,7 @@
           <a:p>
             <a:fld id="{A37A7E16-B735-4BCF-A3C0-B4D8575DFF96}" type="datetimeFigureOut">
               <a:rPr lang="en-CA" smtClean="0"/>
-              <a:t>2025-09-21</a:t>
+              <a:t>2025-09-22</a:t>
             </a:fld>
             <a:endParaRPr lang="en-CA"/>
           </a:p>
@@ -15288,7 +15288,7 @@
           <a:p>
             <a:fld id="{A37A7E16-B735-4BCF-A3C0-B4D8575DFF96}" type="datetimeFigureOut">
               <a:rPr lang="en-CA" smtClean="0"/>
-              <a:t>2025-09-21</a:t>
+              <a:t>2025-09-22</a:t>
             </a:fld>
             <a:endParaRPr lang="en-CA"/>
           </a:p>
@@ -15564,7 +15564,7 @@
           <a:p>
             <a:fld id="{A37A7E16-B735-4BCF-A3C0-B4D8575DFF96}" type="datetimeFigureOut">
               <a:rPr lang="en-CA" smtClean="0"/>
-              <a:t>2025-09-21</a:t>
+              <a:t>2025-09-22</a:t>
             </a:fld>
             <a:endParaRPr lang="en-CA"/>
           </a:p>
@@ -15832,7 +15832,7 @@
           <a:p>
             <a:fld id="{A37A7E16-B735-4BCF-A3C0-B4D8575DFF96}" type="datetimeFigureOut">
               <a:rPr lang="en-CA" smtClean="0"/>
-              <a:t>2025-09-21</a:t>
+              <a:t>2025-09-22</a:t>
             </a:fld>
             <a:endParaRPr lang="en-CA"/>
           </a:p>
@@ -16247,7 +16247,7 @@
           <a:p>
             <a:fld id="{A37A7E16-B735-4BCF-A3C0-B4D8575DFF96}" type="datetimeFigureOut">
               <a:rPr lang="en-CA" smtClean="0"/>
-              <a:t>2025-09-21</a:t>
+              <a:t>2025-09-22</a:t>
             </a:fld>
             <a:endParaRPr lang="en-CA"/>
           </a:p>
@@ -16389,7 +16389,7 @@
           <a:p>
             <a:fld id="{A37A7E16-B735-4BCF-A3C0-B4D8575DFF96}" type="datetimeFigureOut">
               <a:rPr lang="en-CA" smtClean="0"/>
-              <a:t>2025-09-21</a:t>
+              <a:t>2025-09-22</a:t>
             </a:fld>
             <a:endParaRPr lang="en-CA"/>
           </a:p>
@@ -16502,7 +16502,7 @@
           <a:p>
             <a:fld id="{A37A7E16-B735-4BCF-A3C0-B4D8575DFF96}" type="datetimeFigureOut">
               <a:rPr lang="en-CA" smtClean="0"/>
-              <a:t>2025-09-21</a:t>
+              <a:t>2025-09-22</a:t>
             </a:fld>
             <a:endParaRPr lang="en-CA"/>
           </a:p>
@@ -16815,7 +16815,7 @@
           <a:p>
             <a:fld id="{A37A7E16-B735-4BCF-A3C0-B4D8575DFF96}" type="datetimeFigureOut">
               <a:rPr lang="en-CA" smtClean="0"/>
-              <a:t>2025-09-21</a:t>
+              <a:t>2025-09-22</a:t>
             </a:fld>
             <a:endParaRPr lang="en-CA"/>
           </a:p>
@@ -17104,7 +17104,7 @@
           <a:p>
             <a:fld id="{A37A7E16-B735-4BCF-A3C0-B4D8575DFF96}" type="datetimeFigureOut">
               <a:rPr lang="en-CA" smtClean="0"/>
-              <a:t>2025-09-21</a:t>
+              <a:t>2025-09-22</a:t>
             </a:fld>
             <a:endParaRPr lang="en-CA"/>
           </a:p>
@@ -17347,7 +17347,7 @@
           <a:p>
             <a:fld id="{A37A7E16-B735-4BCF-A3C0-B4D8575DFF96}" type="datetimeFigureOut">
               <a:rPr lang="en-CA" smtClean="0"/>
-              <a:t>2025-09-21</a:t>
+              <a:t>2025-09-22</a:t>
             </a:fld>
             <a:endParaRPr lang="en-CA"/>
           </a:p>
@@ -28292,11 +28292,7 @@
           <a:lstStyle/>
           <a:p>
             <a:r>
-              <a:rPr lang="en-CA" sz="3600" dirty="0">
-                <a:solidFill>
-                  <a:schemeClr val="tx2"/>
-                </a:solidFill>
-              </a:rPr>
+              <a:rPr lang="en-CA" dirty="0"/>
               <a:t>Patterns of Employee Performance</a:t>
             </a:r>
           </a:p>

</xml_diff>